<commit_message>
rama + new tools
Signed-off-by: TathagataChakraborti <tathagata.net@live.com>
</commit_message>
<xml_diff>
--- a/public/shared/call.pptx
+++ b/public/shared/call.pptx
@@ -245,7 +245,7 @@
           <a:p>
             <a:fld id="{84B26D5B-C59A-4241-A324-9C722C6D16B4}" type="datetimeFigureOut">
               <a:rPr lang="en-US" smtClean="0"/>
-              <a:t>10/15/22</a:t>
+              <a:t>10/19/22</a:t>
             </a:fld>
             <a:endParaRPr lang="en-US"/>
           </a:p>
@@ -415,7 +415,7 @@
           <a:p>
             <a:fld id="{84B26D5B-C59A-4241-A324-9C722C6D16B4}" type="datetimeFigureOut">
               <a:rPr lang="en-US" smtClean="0"/>
-              <a:t>10/15/22</a:t>
+              <a:t>10/19/22</a:t>
             </a:fld>
             <a:endParaRPr lang="en-US"/>
           </a:p>
@@ -595,7 +595,7 @@
           <a:p>
             <a:fld id="{84B26D5B-C59A-4241-A324-9C722C6D16B4}" type="datetimeFigureOut">
               <a:rPr lang="en-US" smtClean="0"/>
-              <a:t>10/15/22</a:t>
+              <a:t>10/19/22</a:t>
             </a:fld>
             <a:endParaRPr lang="en-US"/>
           </a:p>
@@ -765,7 +765,7 @@
           <a:p>
             <a:fld id="{84B26D5B-C59A-4241-A324-9C722C6D16B4}" type="datetimeFigureOut">
               <a:rPr lang="en-US" smtClean="0"/>
-              <a:t>10/15/22</a:t>
+              <a:t>10/19/22</a:t>
             </a:fld>
             <a:endParaRPr lang="en-US"/>
           </a:p>
@@ -1009,7 +1009,7 @@
           <a:p>
             <a:fld id="{84B26D5B-C59A-4241-A324-9C722C6D16B4}" type="datetimeFigureOut">
               <a:rPr lang="en-US" smtClean="0"/>
-              <a:t>10/15/22</a:t>
+              <a:t>10/19/22</a:t>
             </a:fld>
             <a:endParaRPr lang="en-US"/>
           </a:p>
@@ -1241,7 +1241,7 @@
           <a:p>
             <a:fld id="{84B26D5B-C59A-4241-A324-9C722C6D16B4}" type="datetimeFigureOut">
               <a:rPr lang="en-US" smtClean="0"/>
-              <a:t>10/15/22</a:t>
+              <a:t>10/19/22</a:t>
             </a:fld>
             <a:endParaRPr lang="en-US"/>
           </a:p>
@@ -1608,7 +1608,7 @@
           <a:p>
             <a:fld id="{84B26D5B-C59A-4241-A324-9C722C6D16B4}" type="datetimeFigureOut">
               <a:rPr lang="en-US" smtClean="0"/>
-              <a:t>10/15/22</a:t>
+              <a:t>10/19/22</a:t>
             </a:fld>
             <a:endParaRPr lang="en-US"/>
           </a:p>
@@ -1726,7 +1726,7 @@
           <a:p>
             <a:fld id="{84B26D5B-C59A-4241-A324-9C722C6D16B4}" type="datetimeFigureOut">
               <a:rPr lang="en-US" smtClean="0"/>
-              <a:t>10/15/22</a:t>
+              <a:t>10/19/22</a:t>
             </a:fld>
             <a:endParaRPr lang="en-US"/>
           </a:p>
@@ -1821,7 +1821,7 @@
           <a:p>
             <a:fld id="{84B26D5B-C59A-4241-A324-9C722C6D16B4}" type="datetimeFigureOut">
               <a:rPr lang="en-US" smtClean="0"/>
-              <a:t>10/15/22</a:t>
+              <a:t>10/19/22</a:t>
             </a:fld>
             <a:endParaRPr lang="en-US"/>
           </a:p>
@@ -2098,7 +2098,7 @@
           <a:p>
             <a:fld id="{84B26D5B-C59A-4241-A324-9C722C6D16B4}" type="datetimeFigureOut">
               <a:rPr lang="en-US" smtClean="0"/>
-              <a:t>10/15/22</a:t>
+              <a:t>10/19/22</a:t>
             </a:fld>
             <a:endParaRPr lang="en-US"/>
           </a:p>
@@ -2355,7 +2355,7 @@
           <a:p>
             <a:fld id="{84B26D5B-C59A-4241-A324-9C722C6D16B4}" type="datetimeFigureOut">
               <a:rPr lang="en-US" smtClean="0"/>
-              <a:t>10/15/22</a:t>
+              <a:t>10/19/22</a:t>
             </a:fld>
             <a:endParaRPr lang="en-US"/>
           </a:p>
@@ -2568,7 +2568,7 @@
           <a:p>
             <a:fld id="{84B26D5B-C59A-4241-A324-9C722C6D16B4}" type="datetimeFigureOut">
               <a:rPr lang="en-US" smtClean="0"/>
-              <a:t>10/15/22</a:t>
+              <a:t>10/19/22</a:t>
             </a:fld>
             <a:endParaRPr lang="en-US"/>
           </a:p>

</xml_diff>